<commit_message>
Update Dimensionality Reduction in R.pptx
</commit_message>
<xml_diff>
--- a/Track - Machine Learning/Dimensionality-Reduction-in-R/Dimensionality Reduction in R.pptx
+++ b/Track - Machine Learning/Dimensionality-Reduction-in-R/Dimensionality Reduction in R.pptx
@@ -262,7 +262,7 @@
             <a:fld id="{B61BEF0D-F0BB-DE4B-95CE-6DB70DBA9567}" type="datetimeFigureOut">
               <a:rPr lang="en-US" smtClean="0"/>
               <a:pPr/>
-              <a:t>6/20/2019</a:t>
+              <a:t>6/25/2019</a:t>
             </a:fld>
             <a:endParaRPr lang="en-US" dirty="0"/>
           </a:p>
@@ -434,7 +434,7 @@
             <a:fld id="{B61BEF0D-F0BB-DE4B-95CE-6DB70DBA9567}" type="datetimeFigureOut">
               <a:rPr lang="en-US" smtClean="0"/>
               <a:pPr/>
-              <a:t>6/20/2019</a:t>
+              <a:t>6/25/2019</a:t>
             </a:fld>
             <a:endParaRPr lang="en-US" dirty="0"/>
           </a:p>
@@ -616,7 +616,7 @@
             <a:fld id="{B61BEF0D-F0BB-DE4B-95CE-6DB70DBA9567}" type="datetimeFigureOut">
               <a:rPr lang="en-US" smtClean="0"/>
               <a:pPr/>
-              <a:t>6/20/2019</a:t>
+              <a:t>6/25/2019</a:t>
             </a:fld>
             <a:endParaRPr lang="en-US" dirty="0"/>
           </a:p>
@@ -788,7 +788,7 @@
             <a:fld id="{B61BEF0D-F0BB-DE4B-95CE-6DB70DBA9567}" type="datetimeFigureOut">
               <a:rPr lang="en-US" smtClean="0"/>
               <a:pPr/>
-              <a:t>6/20/2019</a:t>
+              <a:t>6/25/2019</a:t>
             </a:fld>
             <a:endParaRPr lang="en-US" dirty="0"/>
           </a:p>
@@ -1034,7 +1034,7 @@
             <a:fld id="{B61BEF0D-F0BB-DE4B-95CE-6DB70DBA9567}" type="datetimeFigureOut">
               <a:rPr lang="en-US" smtClean="0"/>
               <a:pPr/>
-              <a:t>6/20/2019</a:t>
+              <a:t>6/25/2019</a:t>
             </a:fld>
             <a:endParaRPr lang="en-US" dirty="0"/>
           </a:p>
@@ -1268,7 +1268,7 @@
             <a:fld id="{B61BEF0D-F0BB-DE4B-95CE-6DB70DBA9567}" type="datetimeFigureOut">
               <a:rPr lang="en-US" smtClean="0"/>
               <a:pPr/>
-              <a:t>6/20/2019</a:t>
+              <a:t>6/25/2019</a:t>
             </a:fld>
             <a:endParaRPr lang="en-US" dirty="0"/>
           </a:p>
@@ -1637,7 +1637,7 @@
             <a:fld id="{B61BEF0D-F0BB-DE4B-95CE-6DB70DBA9567}" type="datetimeFigureOut">
               <a:rPr lang="en-US" smtClean="0"/>
               <a:pPr/>
-              <a:t>6/20/2019</a:t>
+              <a:t>6/25/2019</a:t>
             </a:fld>
             <a:endParaRPr lang="en-US" dirty="0"/>
           </a:p>
@@ -1757,7 +1757,7 @@
             <a:fld id="{B61BEF0D-F0BB-DE4B-95CE-6DB70DBA9567}" type="datetimeFigureOut">
               <a:rPr lang="en-US" smtClean="0"/>
               <a:pPr/>
-              <a:t>6/20/2019</a:t>
+              <a:t>6/25/2019</a:t>
             </a:fld>
             <a:endParaRPr lang="en-US" dirty="0"/>
           </a:p>
@@ -1854,7 +1854,7 @@
             <a:fld id="{B61BEF0D-F0BB-DE4B-95CE-6DB70DBA9567}" type="datetimeFigureOut">
               <a:rPr lang="en-US" smtClean="0"/>
               <a:pPr/>
-              <a:t>6/20/2019</a:t>
+              <a:t>6/25/2019</a:t>
             </a:fld>
             <a:endParaRPr lang="en-US" dirty="0"/>
           </a:p>
@@ -2133,7 +2133,7 @@
             <a:fld id="{B61BEF0D-F0BB-DE4B-95CE-6DB70DBA9567}" type="datetimeFigureOut">
               <a:rPr lang="en-US" smtClean="0"/>
               <a:pPr/>
-              <a:t>6/20/2019</a:t>
+              <a:t>6/25/2019</a:t>
             </a:fld>
             <a:endParaRPr lang="en-US" dirty="0"/>
           </a:p>
@@ -2392,7 +2392,7 @@
             <a:fld id="{B61BEF0D-F0BB-DE4B-95CE-6DB70DBA9567}" type="datetimeFigureOut">
               <a:rPr lang="en-US" smtClean="0"/>
               <a:pPr/>
-              <a:t>6/20/2019</a:t>
+              <a:t>6/25/2019</a:t>
             </a:fld>
             <a:endParaRPr lang="en-US" dirty="0"/>
           </a:p>
@@ -2607,7 +2607,7 @@
             <a:fld id="{B61BEF0D-F0BB-DE4B-95CE-6DB70DBA9567}" type="datetimeFigureOut">
               <a:rPr lang="en-US" smtClean="0"/>
               <a:pPr/>
-              <a:t>6/20/2019</a:t>
+              <a:t>6/25/2019</a:t>
             </a:fld>
             <a:endParaRPr lang="en-US" dirty="0"/>
           </a:p>
@@ -3396,11 +3396,7 @@
             </a:pPr>
             <a:r>
               <a:rPr lang="en-US" sz="1050"/>
-              <a:t>Topic detection with N-NMF: </a:t>
-            </a:r>
-            <a:r>
-              <a:rPr lang="en-US" sz="1050"/>
-              <a:t>Part </a:t>
+              <a:t>Topic detection with N-NMF: Part </a:t>
             </a:r>
             <a:r>
               <a:rPr lang="en-US" sz="1050" smtClean="0"/>
@@ -3766,10 +3762,10 @@
           <a:lstStyle/>
           <a:p>
             <a:r>
-              <a:rPr lang="en-US">
+              <a:rPr lang="en-US" smtClean="0">
                 <a:latin typeface="+mn-lt"/>
               </a:rPr>
-              <a:t>Discussion</a:t>
+              <a:t>Principal Component Analysis</a:t>
             </a:r>
             <a:endParaRPr lang="en-US" dirty="0">
               <a:latin typeface="+mn-lt"/>
@@ -3777,157 +3773,78 @@
           </a:p>
         </p:txBody>
       </p:sp>
-      <p:sp>
-        <p:nvSpPr>
-          <p:cNvPr id="3" name="Content Placeholder 2"/>
-          <p:cNvSpPr>
-            <a:spLocks noGrp="1"/>
-          </p:cNvSpPr>
-          <p:nvPr>
-            <p:ph sz="half" idx="1"/>
-          </p:nvPr>
-        </p:nvSpPr>
+      <p:pic>
+        <p:nvPicPr>
+          <p:cNvPr id="3" name="Picture 2"/>
+          <p:cNvPicPr>
+            <a:picLocks noChangeAspect="1"/>
+          </p:cNvPicPr>
+          <p:nvPr/>
+        </p:nvPicPr>
+        <p:blipFill>
+          <a:blip r:embed="rId2"/>
+          <a:stretch>
+            <a:fillRect/>
+          </a:stretch>
+        </p:blipFill>
         <p:spPr>
           <a:xfrm>
-            <a:off x="628650" y="1087717"/>
-            <a:ext cx="7959538" cy="5089245"/>
-          </a:xfrm>
-        </p:spPr>
-        <p:txBody>
-          <a:bodyPr>
-            <a:normAutofit/>
-          </a:bodyPr>
-          <a:lstStyle/>
-          <a:p>
-            <a:pPr marL="0" indent="0">
-              <a:buNone/>
-            </a:pPr>
-            <a:r>
-              <a:rPr lang="en-US" sz="1200" dirty="0"/>
-              <a:t>Many times in ML, the goals is to find patterns in data without trying to make predictions – this is referred to as unsupervised learning. More specifically, this course focuses on clustering and dimensionality reduction.</a:t>
-            </a:r>
-          </a:p>
-          <a:p>
-            <a:pPr marL="0" indent="0">
-              <a:buNone/>
-            </a:pPr>
-            <a:r>
-              <a:rPr lang="en-US" sz="1200" dirty="0"/>
-              <a:t>There are two primary goals of unsupervised learning:</a:t>
-            </a:r>
-          </a:p>
-          <a:p>
-            <a:pPr marL="460375" indent="-460375">
-              <a:buNone/>
-            </a:pPr>
-            <a:r>
-              <a:rPr lang="en-US" sz="1200" dirty="0"/>
-              <a:t>	Find homogenous subgroups within larger group</a:t>
-            </a:r>
-          </a:p>
-          <a:p>
-            <a:pPr marL="460375" indent="-460375">
-              <a:buNone/>
-            </a:pPr>
-            <a:r>
-              <a:rPr lang="en-US" sz="1200" dirty="0"/>
-              <a:t>	Find patterns in the features of the data (dimensionality reduction is one way to do this)</a:t>
-            </a:r>
-          </a:p>
-          <a:p>
-            <a:pPr marL="460375" indent="-460375">
-              <a:buNone/>
-            </a:pPr>
-            <a:endParaRPr lang="en-US" sz="1200" dirty="0"/>
-          </a:p>
-          <a:p>
-            <a:pPr marL="460375" indent="-460375">
-              <a:buNone/>
-            </a:pPr>
-            <a:r>
-              <a:rPr lang="en-US" sz="1200" dirty="0"/>
-              <a:t>There are three primary goals of dimensionality reduction:</a:t>
-            </a:r>
-          </a:p>
-          <a:p>
-            <a:pPr marL="460375" indent="-460375">
-              <a:buNone/>
-            </a:pPr>
-            <a:r>
-              <a:rPr lang="en-US" sz="1200" dirty="0"/>
-              <a:t>	Find patters in the features of the data</a:t>
-            </a:r>
-          </a:p>
-          <a:p>
-            <a:pPr marL="460375" indent="-460375">
-              <a:buNone/>
-            </a:pPr>
-            <a:r>
-              <a:rPr lang="en-US" sz="1200" dirty="0"/>
-              <a:t>	Visualization of high dimensional data</a:t>
-            </a:r>
-          </a:p>
-          <a:p>
-            <a:pPr marL="460375" indent="-460375">
-              <a:buNone/>
-            </a:pPr>
-            <a:r>
-              <a:rPr lang="en-US" sz="1200" dirty="0"/>
-              <a:t>	Pre-processing before supervised learning</a:t>
-            </a:r>
-          </a:p>
-          <a:p>
-            <a:pPr marL="460375" indent="-460375">
-              <a:buNone/>
-            </a:pPr>
-            <a:endParaRPr lang="en-US" sz="1200" dirty="0"/>
-          </a:p>
-          <a:p>
-            <a:pPr marL="460375" indent="-460375">
-              <a:buNone/>
-            </a:pPr>
-            <a:r>
-              <a:rPr lang="en-US" sz="1200" dirty="0"/>
-              <a:t>Challenges and benefits of unsupervised learning:</a:t>
-            </a:r>
-          </a:p>
-          <a:p>
-            <a:pPr marL="460375" indent="-460375">
-              <a:buNone/>
-            </a:pPr>
-            <a:r>
-              <a:rPr lang="en-US" sz="1200" dirty="0"/>
-              <a:t>	No </a:t>
-            </a:r>
-            <a:r>
-              <a:rPr lang="en-US" sz="1200" dirty="0" err="1"/>
-              <a:t>signle</a:t>
-            </a:r>
-            <a:r>
-              <a:rPr lang="en-US" sz="1200" dirty="0"/>
-              <a:t> goal of the analysis</a:t>
-            </a:r>
-          </a:p>
-          <a:p>
-            <a:pPr marL="460375" indent="-460375">
-              <a:buNone/>
-            </a:pPr>
-            <a:r>
-              <a:rPr lang="en-US" sz="1200" dirty="0"/>
-              <a:t>	Requires more creativity</a:t>
-            </a:r>
-          </a:p>
-          <a:p>
-            <a:pPr marL="460375" indent="-460375">
-              <a:buNone/>
-            </a:pPr>
-            <a:r>
-              <a:rPr lang="en-US" sz="1200" dirty="0"/>
-              <a:t>	Much more unlabeled data available than cleanly labels data</a:t>
-            </a:r>
-          </a:p>
-        </p:txBody>
-      </p:sp>
+            <a:off x="633506" y="1093418"/>
+            <a:ext cx="3195177" cy="1339430"/>
+          </a:xfrm>
+          <a:prstGeom prst="rect">
+            <a:avLst/>
+          </a:prstGeom>
+        </p:spPr>
+      </p:pic>
+      <p:pic>
+        <p:nvPicPr>
+          <p:cNvPr id="4" name="Picture 3"/>
+          <p:cNvPicPr>
+            <a:picLocks noChangeAspect="1"/>
+          </p:cNvPicPr>
+          <p:nvPr/>
+        </p:nvPicPr>
+        <p:blipFill>
+          <a:blip r:embed="rId3"/>
+          <a:stretch>
+            <a:fillRect/>
+          </a:stretch>
+        </p:blipFill>
+        <p:spPr>
+          <a:xfrm>
+            <a:off x="633505" y="2692594"/>
+            <a:ext cx="2421649" cy="1060630"/>
+          </a:xfrm>
+          <a:prstGeom prst="rect">
+            <a:avLst/>
+          </a:prstGeom>
+        </p:spPr>
+      </p:pic>
+      <p:pic>
+        <p:nvPicPr>
+          <p:cNvPr id="5" name="Picture 4"/>
+          <p:cNvPicPr>
+            <a:picLocks noChangeAspect="1"/>
+          </p:cNvPicPr>
+          <p:nvPr/>
+        </p:nvPicPr>
+        <p:blipFill>
+          <a:blip r:embed="rId4"/>
+          <a:stretch>
+            <a:fillRect/>
+          </a:stretch>
+        </p:blipFill>
+        <p:spPr>
+          <a:xfrm>
+            <a:off x="4600575" y="1093418"/>
+            <a:ext cx="3468934" cy="1444947"/>
+          </a:xfrm>
+          <a:prstGeom prst="rect">
+            <a:avLst/>
+          </a:prstGeom>
+        </p:spPr>
+      </p:pic>
     </p:spTree>
     <p:extLst>
       <p:ext uri="{BB962C8B-B14F-4D97-AF65-F5344CB8AC3E}">

</xml_diff>